<commit_message>
Fixed architecture diagram for IRIS
</commit_message>
<xml_diff>
--- a/Demos/IRIS/architecture.pptx
+++ b/Demos/IRIS/architecture.pptx
@@ -105,6 +105,11 @@
       </a:defRPr>
     </a:lvl9pPr>
   </p:defaultTextStyle>
+  <p:extLst>
+    <p:ext uri="{EFAFB233-063F-42B5-8137-9DF3F51BA10A}">
+      <p15:sldGuideLst xmlns:p15="http://schemas.microsoft.com/office/powerpoint/2012/main"/>
+    </p:ext>
+  </p:extLst>
 </p:presentation>
 </file>
 
@@ -255,7 +260,7 @@
           <a:p>
             <a:fld id="{CCB49A88-FD5C-4B37-B175-0F9F03701D85}" type="datetimeFigureOut">
               <a:rPr lang="en-US" smtClean="0"/>
-              <a:t>7/19/2023</a:t>
+              <a:t>7/20/2023</a:t>
             </a:fld>
             <a:endParaRPr lang="en-US"/>
           </a:p>
@@ -453,7 +458,7 @@
           <a:p>
             <a:fld id="{CCB49A88-FD5C-4B37-B175-0F9F03701D85}" type="datetimeFigureOut">
               <a:rPr lang="en-US" smtClean="0"/>
-              <a:t>7/19/2023</a:t>
+              <a:t>7/20/2023</a:t>
             </a:fld>
             <a:endParaRPr lang="en-US"/>
           </a:p>
@@ -661,7 +666,7 @@
           <a:p>
             <a:fld id="{CCB49A88-FD5C-4B37-B175-0F9F03701D85}" type="datetimeFigureOut">
               <a:rPr lang="en-US" smtClean="0"/>
-              <a:t>7/19/2023</a:t>
+              <a:t>7/20/2023</a:t>
             </a:fld>
             <a:endParaRPr lang="en-US"/>
           </a:p>
@@ -859,7 +864,7 @@
           <a:p>
             <a:fld id="{CCB49A88-FD5C-4B37-B175-0F9F03701D85}" type="datetimeFigureOut">
               <a:rPr lang="en-US" smtClean="0"/>
-              <a:t>7/19/2023</a:t>
+              <a:t>7/20/2023</a:t>
             </a:fld>
             <a:endParaRPr lang="en-US"/>
           </a:p>
@@ -1134,7 +1139,7 @@
           <a:p>
             <a:fld id="{CCB49A88-FD5C-4B37-B175-0F9F03701D85}" type="datetimeFigureOut">
               <a:rPr lang="en-US" smtClean="0"/>
-              <a:t>7/19/2023</a:t>
+              <a:t>7/20/2023</a:t>
             </a:fld>
             <a:endParaRPr lang="en-US"/>
           </a:p>
@@ -1399,7 +1404,7 @@
           <a:p>
             <a:fld id="{CCB49A88-FD5C-4B37-B175-0F9F03701D85}" type="datetimeFigureOut">
               <a:rPr lang="en-US" smtClean="0"/>
-              <a:t>7/19/2023</a:t>
+              <a:t>7/20/2023</a:t>
             </a:fld>
             <a:endParaRPr lang="en-US"/>
           </a:p>
@@ -1811,7 +1816,7 @@
           <a:p>
             <a:fld id="{CCB49A88-FD5C-4B37-B175-0F9F03701D85}" type="datetimeFigureOut">
               <a:rPr lang="en-US" smtClean="0"/>
-              <a:t>7/19/2023</a:t>
+              <a:t>7/20/2023</a:t>
             </a:fld>
             <a:endParaRPr lang="en-US"/>
           </a:p>
@@ -1952,7 +1957,7 @@
           <a:p>
             <a:fld id="{CCB49A88-FD5C-4B37-B175-0F9F03701D85}" type="datetimeFigureOut">
               <a:rPr lang="en-US" smtClean="0"/>
-              <a:t>7/19/2023</a:t>
+              <a:t>7/20/2023</a:t>
             </a:fld>
             <a:endParaRPr lang="en-US"/>
           </a:p>
@@ -2065,7 +2070,7 @@
           <a:p>
             <a:fld id="{CCB49A88-FD5C-4B37-B175-0F9F03701D85}" type="datetimeFigureOut">
               <a:rPr lang="en-US" smtClean="0"/>
-              <a:t>7/19/2023</a:t>
+              <a:t>7/20/2023</a:t>
             </a:fld>
             <a:endParaRPr lang="en-US"/>
           </a:p>
@@ -2376,7 +2381,7 @@
           <a:p>
             <a:fld id="{CCB49A88-FD5C-4B37-B175-0F9F03701D85}" type="datetimeFigureOut">
               <a:rPr lang="en-US" smtClean="0"/>
-              <a:t>7/19/2023</a:t>
+              <a:t>7/20/2023</a:t>
             </a:fld>
             <a:endParaRPr lang="en-US"/>
           </a:p>
@@ -2664,7 +2669,7 @@
           <a:p>
             <a:fld id="{CCB49A88-FD5C-4B37-B175-0F9F03701D85}" type="datetimeFigureOut">
               <a:rPr lang="en-US" smtClean="0"/>
-              <a:t>7/19/2023</a:t>
+              <a:t>7/20/2023</a:t>
             </a:fld>
             <a:endParaRPr lang="en-US"/>
           </a:p>
@@ -2905,7 +2910,7 @@
           <a:p>
             <a:fld id="{CCB49A88-FD5C-4B37-B175-0F9F03701D85}" type="datetimeFigureOut">
               <a:rPr lang="en-US" smtClean="0"/>
-              <a:t>7/19/2023</a:t>
+              <a:t>7/20/2023</a:t>
             </a:fld>
             <a:endParaRPr lang="en-US"/>
           </a:p>
@@ -3556,8 +3561,8 @@
         </p:nvCxnSpPr>
         <p:spPr>
           <a:xfrm flipH="1">
-            <a:off x="6070703" y="2563890"/>
-            <a:ext cx="1221132" cy="1146411"/>
+            <a:off x="5988159" y="2707616"/>
+            <a:ext cx="1527356" cy="1106133"/>
           </a:xfrm>
           <a:prstGeom prst="straightConnector1">
             <a:avLst/>
@@ -3641,8 +3646,8 @@
           <p:nvPr/>
         </p:nvSpPr>
         <p:spPr>
-          <a:xfrm rot="19019437">
-            <a:off x="5887421" y="2573331"/>
+          <a:xfrm rot="19365962">
+            <a:off x="6329528" y="3128917"/>
             <a:ext cx="1347951" cy="600164"/>
           </a:xfrm>
           <a:prstGeom prst="rect">
@@ -4066,13 +4071,14 @@
           </p:cNvPr>
           <p:cNvCxnSpPr>
             <a:cxnSpLocks/>
+            <a:stCxn id="22" idx="0"/>
           </p:cNvCxnSpPr>
           <p:nvPr/>
         </p:nvCxnSpPr>
         <p:spPr>
           <a:xfrm flipV="1">
-            <a:off x="6305005" y="2744735"/>
-            <a:ext cx="1160761" cy="1093648"/>
+            <a:off x="3531733" y="2429691"/>
+            <a:ext cx="4005608" cy="1456626"/>
           </a:xfrm>
           <a:prstGeom prst="straightConnector1">
             <a:avLst/>
@@ -4109,8 +4115,8 @@
           <p:nvPr/>
         </p:nvSpPr>
         <p:spPr>
-          <a:xfrm rot="19019437">
-            <a:off x="6281301" y="3244485"/>
+          <a:xfrm rot="20321113">
+            <a:off x="4911476" y="2849476"/>
             <a:ext cx="1347951" cy="261610"/>
           </a:xfrm>
           <a:prstGeom prst="rect">

</xml_diff>